<commit_message>
added class meeting minutes 04-01, presentation iteration 2 final
</commit_message>
<xml_diff>
--- a/class_documents/presentations/iteration_2_presentation.pptx
+++ b/class_documents/presentations/iteration_2_presentation.pptx
@@ -6225,6 +6225,36 @@
           </a:p>
         </p:txBody>
       </p:sp>
+      <p:sp>
+        <p:nvSpPr>
+          <p:cNvPr id="5" name="TextBox 4"/>
+          <p:cNvSpPr txBox="1"/>
+          <p:nvPr/>
+        </p:nvSpPr>
+        <p:spPr>
+          <a:xfrm>
+            <a:off x="5461959" y="1916667"/>
+            <a:ext cx="1268082" cy="369332"/>
+          </a:xfrm>
+          <a:prstGeom prst="rect">
+            <a:avLst/>
+          </a:prstGeom>
+          <a:noFill/>
+        </p:spPr>
+        <p:txBody>
+          <a:bodyPr wrap="square" rtlCol="0">
+            <a:spAutoFit/>
+          </a:bodyPr>
+          <a:lstStyle/>
+          <a:p>
+            <a:r>
+              <a:rPr lang="en-US" dirty="0" smtClean="0"/>
+              <a:t>3-layer</a:t>
+            </a:r>
+            <a:endParaRPr lang="en-US" dirty="0"/>
+          </a:p>
+        </p:txBody>
+      </p:sp>
     </p:spTree>
     <p:extLst>
       <p:ext uri="{BB962C8B-B14F-4D97-AF65-F5344CB8AC3E}">
@@ -6509,10 +6539,15 @@
             <p:ph idx="1"/>
           </p:nvPr>
         </p:nvSpPr>
-        <p:spPr/>
+        <p:spPr>
+          <a:xfrm>
+            <a:off x="1295401" y="2556931"/>
+            <a:ext cx="9601196" cy="3619279"/>
+          </a:xfrm>
+        </p:spPr>
         <p:txBody>
           <a:bodyPr>
-            <a:normAutofit fontScale="70000" lnSpcReduction="20000"/>
+            <a:normAutofit fontScale="77500" lnSpcReduction="20000"/>
           </a:bodyPr>
           <a:lstStyle/>
           <a:p>
@@ -6525,15 +6560,7 @@
             <a:pPr lvl="1"/>
             <a:r>
               <a:rPr lang="en-US" dirty="0" smtClean="0"/>
-              <a:t>Existing Feature/Functionality </a:t>
-            </a:r>
-            <a:r>
-              <a:rPr lang="en-US" dirty="0" smtClean="0"/>
-              <a:t>Expansion, team </a:t>
-            </a:r>
-            <a:r>
-              <a:rPr lang="en-US" dirty="0" smtClean="0"/>
-              <a:t>was focused on stability of the platform and deployment</a:t>
+              <a:t>Existing Feature/Functionality Expansion, team was focused on stability of the platform and deployment</a:t>
             </a:r>
           </a:p>
           <a:p>
@@ -6560,13 +6587,8 @@
             <a:pPr lvl="1"/>
             <a:r>
               <a:rPr lang="en-US" dirty="0" smtClean="0"/>
-              <a:t>Cross-team component objects (projects, user authentication) – will be included in the </a:t>
-            </a:r>
-            <a:r>
-              <a:rPr lang="en-US" dirty="0" smtClean="0"/>
-              <a:t>integration phase</a:t>
-            </a:r>
-            <a:endParaRPr lang="en-US" dirty="0" smtClean="0"/>
+              <a:t>Cross-team component objects (projects, user authentication) – will be included in the integration phase</a:t>
+            </a:r>
           </a:p>
           <a:p>
             <a:r>
@@ -6602,7 +6624,6 @@
               <a:rPr lang="en-US" dirty="0" smtClean="0"/>
               <a:t>(FTs, Unit Tests, Code Coverage)</a:t>
             </a:r>
-            <a:endParaRPr lang="en-US" dirty="0" smtClean="0"/>
           </a:p>
           <a:p>
             <a:endParaRPr lang="en-US" dirty="0"/>

</xml_diff>